<commit_message>
fix indexing on dataframe after createDataPartition(); fix F1 score calculation in 2 places
</commit_message>
<xml_diff>
--- a/ML Supervised Classification.pptx
+++ b/ML Supervised Classification.pptx
@@ -133,6 +133,73 @@
 </p:presentation>
 </file>
 
+<file path=ppt/revisionInfo.xml><?xml version="1.0" encoding="utf-8"?>
+<p1510:revInfo xmlns:a="http://schemas.openxmlformats.org/drawingml/2006/main" xmlns:r="http://schemas.openxmlformats.org/officeDocument/2006/relationships" xmlns:p1510="http://schemas.microsoft.com/office/powerpoint/2015/10/main">
+  <p1510:revLst>
+    <p1510:client id="{15C59020-73CE-4730-B604-41881A5DD875}" v="13" dt="2024-02-29T16:56:44.535"/>
+  </p1510:revLst>
+</p1510:revInfo>
+</file>
+
+<file path=ppt/changesInfos/changesInfo1.xml><?xml version="1.0" encoding="utf-8"?>
+<pc:chgInfo xmlns:a="http://schemas.openxmlformats.org/drawingml/2006/main" xmlns:r="http://schemas.openxmlformats.org/officeDocument/2006/relationships" xmlns:ac="http://schemas.microsoft.com/office/drawing/2013/main/command" xmlns:pc="http://schemas.microsoft.com/office/powerpoint/2013/main/command">
+  <pc:docChgLst>
+    <pc:chgData name="Kevin Shu" userId="6acc1fb1e5f6e529" providerId="Windows Live" clId="Web-{15C59020-73CE-4730-B604-41881A5DD875}"/>
+    <pc:docChg chg="modSld">
+      <pc:chgData name="Kevin Shu" userId="6acc1fb1e5f6e529" providerId="Windows Live" clId="Web-{15C59020-73CE-4730-B604-41881A5DD875}" dt="2024-02-29T16:54:05.838" v="5"/>
+      <pc:docMkLst>
+        <pc:docMk/>
+      </pc:docMkLst>
+      <pc:sldChg chg="modSp">
+        <pc:chgData name="Kevin Shu" userId="6acc1fb1e5f6e529" providerId="Windows Live" clId="Web-{15C59020-73CE-4730-B604-41881A5DD875}" dt="2024-02-29T16:52:18.143" v="1" actId="20577"/>
+        <pc:sldMkLst>
+          <pc:docMk/>
+          <pc:sldMk cId="2093531430" sldId="278"/>
+        </pc:sldMkLst>
+        <pc:spChg chg="mod">
+          <ac:chgData name="Kevin Shu" userId="6acc1fb1e5f6e529" providerId="Windows Live" clId="Web-{15C59020-73CE-4730-B604-41881A5DD875}" dt="2024-02-29T16:52:18.143" v="1" actId="20577"/>
+          <ac:spMkLst>
+            <pc:docMk/>
+            <pc:sldMk cId="2093531430" sldId="278"/>
+            <ac:spMk id="6" creationId="{9A470DE5-A601-A0EA-7796-DCFB31351EEF}"/>
+          </ac:spMkLst>
+        </pc:spChg>
+      </pc:sldChg>
+      <pc:sldChg chg="modSp">
+        <pc:chgData name="Kevin Shu" userId="6acc1fb1e5f6e529" providerId="Windows Live" clId="Web-{15C59020-73CE-4730-B604-41881A5DD875}" dt="2024-02-29T16:53:50.618" v="3"/>
+        <pc:sldMkLst>
+          <pc:docMk/>
+          <pc:sldMk cId="2027014086" sldId="282"/>
+        </pc:sldMkLst>
+        <pc:graphicFrameChg chg="mod modGraphic">
+          <ac:chgData name="Kevin Shu" userId="6acc1fb1e5f6e529" providerId="Windows Live" clId="Web-{15C59020-73CE-4730-B604-41881A5DD875}" dt="2024-02-29T16:53:50.618" v="3"/>
+          <ac:graphicFrameMkLst>
+            <pc:docMk/>
+            <pc:sldMk cId="2027014086" sldId="282"/>
+            <ac:graphicFrameMk id="6" creationId="{5AAF52B2-E6F1-FD96-C462-000E0617107D}"/>
+          </ac:graphicFrameMkLst>
+        </pc:graphicFrameChg>
+      </pc:sldChg>
+      <pc:sldChg chg="modSp">
+        <pc:chgData name="Kevin Shu" userId="6acc1fb1e5f6e529" providerId="Windows Live" clId="Web-{15C59020-73CE-4730-B604-41881A5DD875}" dt="2024-02-29T16:54:05.838" v="5"/>
+        <pc:sldMkLst>
+          <pc:docMk/>
+          <pc:sldMk cId="3786376538" sldId="284"/>
+        </pc:sldMkLst>
+        <pc:graphicFrameChg chg="mod modGraphic">
+          <ac:chgData name="Kevin Shu" userId="6acc1fb1e5f6e529" providerId="Windows Live" clId="Web-{15C59020-73CE-4730-B604-41881A5DD875}" dt="2024-02-29T16:54:05.838" v="5"/>
+          <ac:graphicFrameMkLst>
+            <pc:docMk/>
+            <pc:sldMk cId="3786376538" sldId="284"/>
+            <ac:graphicFrameMk id="5" creationId="{DF5AC407-EF8C-1803-AA1C-69BAE11E59FF}"/>
+          </ac:graphicFrameMkLst>
+        </pc:graphicFrameChg>
+      </pc:sldChg>
+    </pc:docChg>
+  </pc:docChgLst>
+</pc:chgInfo>
+</file>
+
 <file path=ppt/ink/ink1.xml><?xml version="1.0" encoding="utf-8"?>
 <inkml:ink xmlns:inkml="http://www.w3.org/2003/InkML">
   <inkml:definitions>
@@ -309,7 +376,7 @@
           <a:p>
             <a:fld id="{DAA7DA7B-E6F3-409E-86BF-63E2FA31D32B}" type="datetimeFigureOut">
               <a:rPr lang="en-US" smtClean="0"/>
-              <a:t>2/27/2024</a:t>
+              <a:t>2/29/2024</a:t>
             </a:fld>
             <a:endParaRPr lang="en-US"/>
           </a:p>
@@ -507,7 +574,7 @@
           <a:p>
             <a:fld id="{DAA7DA7B-E6F3-409E-86BF-63E2FA31D32B}" type="datetimeFigureOut">
               <a:rPr lang="en-US" smtClean="0"/>
-              <a:t>2/27/2024</a:t>
+              <a:t>2/29/2024</a:t>
             </a:fld>
             <a:endParaRPr lang="en-US"/>
           </a:p>
@@ -715,7 +782,7 @@
           <a:p>
             <a:fld id="{DAA7DA7B-E6F3-409E-86BF-63E2FA31D32B}" type="datetimeFigureOut">
               <a:rPr lang="en-US" smtClean="0"/>
-              <a:t>2/27/2024</a:t>
+              <a:t>2/29/2024</a:t>
             </a:fld>
             <a:endParaRPr lang="en-US"/>
           </a:p>
@@ -913,7 +980,7 @@
           <a:p>
             <a:fld id="{DAA7DA7B-E6F3-409E-86BF-63E2FA31D32B}" type="datetimeFigureOut">
               <a:rPr lang="en-US" smtClean="0"/>
-              <a:t>2/27/2024</a:t>
+              <a:t>2/29/2024</a:t>
             </a:fld>
             <a:endParaRPr lang="en-US"/>
           </a:p>
@@ -1188,7 +1255,7 @@
           <a:p>
             <a:fld id="{DAA7DA7B-E6F3-409E-86BF-63E2FA31D32B}" type="datetimeFigureOut">
               <a:rPr lang="en-US" smtClean="0"/>
-              <a:t>2/27/2024</a:t>
+              <a:t>2/29/2024</a:t>
             </a:fld>
             <a:endParaRPr lang="en-US"/>
           </a:p>
@@ -1453,7 +1520,7 @@
           <a:p>
             <a:fld id="{DAA7DA7B-E6F3-409E-86BF-63E2FA31D32B}" type="datetimeFigureOut">
               <a:rPr lang="en-US" smtClean="0"/>
-              <a:t>2/27/2024</a:t>
+              <a:t>2/29/2024</a:t>
             </a:fld>
             <a:endParaRPr lang="en-US"/>
           </a:p>
@@ -1865,7 +1932,7 @@
           <a:p>
             <a:fld id="{DAA7DA7B-E6F3-409E-86BF-63E2FA31D32B}" type="datetimeFigureOut">
               <a:rPr lang="en-US" smtClean="0"/>
-              <a:t>2/27/2024</a:t>
+              <a:t>2/29/2024</a:t>
             </a:fld>
             <a:endParaRPr lang="en-US"/>
           </a:p>
@@ -2006,7 +2073,7 @@
           <a:p>
             <a:fld id="{DAA7DA7B-E6F3-409E-86BF-63E2FA31D32B}" type="datetimeFigureOut">
               <a:rPr lang="en-US" smtClean="0"/>
-              <a:t>2/27/2024</a:t>
+              <a:t>2/29/2024</a:t>
             </a:fld>
             <a:endParaRPr lang="en-US"/>
           </a:p>
@@ -2119,7 +2186,7 @@
           <a:p>
             <a:fld id="{DAA7DA7B-E6F3-409E-86BF-63E2FA31D32B}" type="datetimeFigureOut">
               <a:rPr lang="en-US" smtClean="0"/>
-              <a:t>2/27/2024</a:t>
+              <a:t>2/29/2024</a:t>
             </a:fld>
             <a:endParaRPr lang="en-US"/>
           </a:p>
@@ -2430,7 +2497,7 @@
           <a:p>
             <a:fld id="{DAA7DA7B-E6F3-409E-86BF-63E2FA31D32B}" type="datetimeFigureOut">
               <a:rPr lang="en-US" smtClean="0"/>
-              <a:t>2/27/2024</a:t>
+              <a:t>2/29/2024</a:t>
             </a:fld>
             <a:endParaRPr lang="en-US"/>
           </a:p>
@@ -2718,7 +2785,7 @@
           <a:p>
             <a:fld id="{DAA7DA7B-E6F3-409E-86BF-63E2FA31D32B}" type="datetimeFigureOut">
               <a:rPr lang="en-US" smtClean="0"/>
-              <a:t>2/27/2024</a:t>
+              <a:t>2/29/2024</a:t>
             </a:fld>
             <a:endParaRPr lang="en-US"/>
           </a:p>
@@ -2959,7 +3026,7 @@
           <a:p>
             <a:fld id="{DAA7DA7B-E6F3-409E-86BF-63E2FA31D32B}" type="datetimeFigureOut">
               <a:rPr lang="en-US" smtClean="0"/>
-              <a:t>2/27/2024</a:t>
+              <a:t>2/29/2024</a:t>
             </a:fld>
             <a:endParaRPr lang="en-US"/>
           </a:p>
@@ -5263,7 +5330,7 @@
           <a:noFill/>
         </p:spPr>
         <p:txBody>
-          <a:bodyPr wrap="square" rtlCol="0">
+          <a:bodyPr wrap="square" lIns="91440" tIns="45720" rIns="91440" bIns="45720" rtlCol="0" anchor="t">
             <a:spAutoFit/>
           </a:bodyPr>
           <a:lstStyle/>
@@ -5366,31 +5433,31 @@
           <a:p>
             <a:r>
               <a:rPr lang="en-US" dirty="0" err="1">
-                <a:latin typeface="Courier New" panose="02070309020205020404" pitchFamily="49" charset="0"/>
-                <a:cs typeface="Courier New" panose="02070309020205020404" pitchFamily="49" charset="0"/>
+                <a:latin typeface="Courier New"/>
+                <a:cs typeface="Courier New"/>
               </a:rPr>
               <a:t>creditcard.test</a:t>
             </a:r>
             <a:r>
               <a:rPr lang="en-US" dirty="0">
-                <a:latin typeface="Courier New" panose="02070309020205020404" pitchFamily="49" charset="0"/>
-                <a:cs typeface="Courier New" panose="02070309020205020404" pitchFamily="49" charset="0"/>
+                <a:latin typeface="Courier New"/>
+                <a:cs typeface="Courier New"/>
               </a:rPr>
               <a:t> &lt;- </a:t>
             </a:r>
             <a:r>
               <a:rPr lang="en-US" dirty="0" err="1">
-                <a:latin typeface="Courier New" panose="02070309020205020404" pitchFamily="49" charset="0"/>
-                <a:cs typeface="Courier New" panose="02070309020205020404" pitchFamily="49" charset="0"/>
+                <a:latin typeface="Courier New"/>
+                <a:cs typeface="Courier New"/>
               </a:rPr>
               <a:t>df</a:t>
             </a:r>
             <a:r>
               <a:rPr lang="en-US" dirty="0">
-                <a:latin typeface="Courier New" panose="02070309020205020404" pitchFamily="49" charset="0"/>
-                <a:cs typeface="Courier New" panose="02070309020205020404" pitchFamily="49" charset="0"/>
+                <a:latin typeface="Courier New"/>
+                <a:cs typeface="Courier New"/>
               </a:rPr>
-              <a:t>[ split,]</a:t>
+              <a:t>[-split,]</a:t>
             </a:r>
           </a:p>
           <a:p>
@@ -5987,7 +6054,7 @@
           <p:nvPr>
             <p:extLst>
               <p:ext uri="{D42A27DB-BD31-4B8C-83A1-F6EECF244321}">
-                <p14:modId xmlns:p14="http://schemas.microsoft.com/office/powerpoint/2010/main" val="1459824578"/>
+                <p14:modId xmlns:p14="http://schemas.microsoft.com/office/powerpoint/2010/main" val="1809993064"/>
               </p:ext>
             </p:extLst>
           </p:nvPr>
@@ -6204,7 +6271,7 @@
                     <a:p>
                       <a:r>
                         <a:rPr lang="en-US" sz="2800" dirty="0"/>
-                        <a:t>.91</a:t>
+                        <a:t>.99</a:t>
                       </a:r>
                     </a:p>
                   </a:txBody>
@@ -7008,7 +7075,7 @@
           <p:nvPr>
             <p:extLst>
               <p:ext uri="{D42A27DB-BD31-4B8C-83A1-F6EECF244321}">
-                <p14:modId xmlns:p14="http://schemas.microsoft.com/office/powerpoint/2010/main" val="2777198646"/>
+                <p14:modId xmlns:p14="http://schemas.microsoft.com/office/powerpoint/2010/main" val="402546364"/>
               </p:ext>
             </p:extLst>
           </p:nvPr>
@@ -7225,7 +7292,7 @@
                     <a:p>
                       <a:r>
                         <a:rPr lang="en-US" sz="2800" dirty="0"/>
-                        <a:t>.91</a:t>
+                        <a:t>.99</a:t>
                       </a:r>
                     </a:p>
                   </a:txBody>

</xml_diff>